<commit_message>
Changed the slides according to teacher
</commit_message>
<xml_diff>
--- a/Routify/doc/routify_presentation.pptx
+++ b/Routify/doc/routify_presentation.pptx
@@ -6,11 +6,11 @@
   </p:sldMasterIdLst>
   <p:sldIdLst>
     <p:sldId id="256" r:id="rId2"/>
-    <p:sldId id="257" r:id="rId3"/>
-    <p:sldId id="258" r:id="rId4"/>
-    <p:sldId id="259" r:id="rId5"/>
+    <p:sldId id="261" r:id="rId3"/>
+    <p:sldId id="259" r:id="rId4"/>
+    <p:sldId id="258" r:id="rId5"/>
     <p:sldId id="260" r:id="rId6"/>
-    <p:sldId id="261" r:id="rId7"/>
+    <p:sldId id="263" r:id="rId7"/>
     <p:sldId id="262" r:id="rId8"/>
   </p:sldIdLst>
   <p:sldSz cx="12192000" cy="6858000"/>
@@ -168,7 +168,7 @@
           <a:noFill/>
           <a:extLst>
             <a:ext uri="{909E8E84-426E-40dd-AFC4-6F175D3DCCD1}">
-              <a14:hiddenFill xmlns="" xmlns:a14="http://schemas.microsoft.com/office/drawing/2010/main">
+              <a14:hiddenFill xmlns:a14="http://schemas.microsoft.com/office/drawing/2010/main" xmlns="">
                 <a:solidFill>
                   <a:srgbClr val="FFFFFF"/>
                 </a:solidFill>
@@ -228,7 +228,7 @@
             </a:ln>
             <a:extLst>
               <a:ext uri="{91240B29-F687-4f45-9708-019B960494DF}">
-                <a14:hiddenLine xmlns="" xmlns:a14="http://schemas.microsoft.com/office/drawing/2010/main" w="9525">
+                <a14:hiddenLine xmlns:a14="http://schemas.microsoft.com/office/drawing/2010/main" xmlns="" w="9525">
                   <a:solidFill>
                     <a:srgbClr val="000000"/>
                   </a:solidFill>
@@ -318,7 +318,7 @@
             </a:ln>
             <a:extLst>
               <a:ext uri="{91240B29-F687-4f45-9708-019B960494DF}">
-                <a14:hiddenLine xmlns="" xmlns:a14="http://schemas.microsoft.com/office/drawing/2010/main" w="9525">
+                <a14:hiddenLine xmlns:a14="http://schemas.microsoft.com/office/drawing/2010/main" xmlns="" w="9525">
                   <a:solidFill>
                     <a:srgbClr val="000000"/>
                   </a:solidFill>
@@ -408,7 +408,7 @@
             </a:ln>
             <a:extLst>
               <a:ext uri="{91240B29-F687-4f45-9708-019B960494DF}">
-                <a14:hiddenLine xmlns="" xmlns:a14="http://schemas.microsoft.com/office/drawing/2010/main" w="9525">
+                <a14:hiddenLine xmlns:a14="http://schemas.microsoft.com/office/drawing/2010/main" xmlns="" w="9525">
                   <a:solidFill>
                     <a:srgbClr val="000000"/>
                   </a:solidFill>
@@ -442,7 +442,7 @@
             </a:ln>
             <a:extLst>
               <a:ext uri="{91240B29-F687-4f45-9708-019B960494DF}">
-                <a14:hiddenLine xmlns="" xmlns:a14="http://schemas.microsoft.com/office/drawing/2010/main" w="9525">
+                <a14:hiddenLine xmlns:a14="http://schemas.microsoft.com/office/drawing/2010/main" xmlns="" w="9525">
                   <a:solidFill>
                     <a:srgbClr val="000000"/>
                   </a:solidFill>
@@ -532,7 +532,7 @@
             </a:ln>
             <a:extLst>
               <a:ext uri="{91240B29-F687-4f45-9708-019B960494DF}">
-                <a14:hiddenLine xmlns="" xmlns:a14="http://schemas.microsoft.com/office/drawing/2010/main" w="9525">
+                <a14:hiddenLine xmlns:a14="http://schemas.microsoft.com/office/drawing/2010/main" xmlns="" w="9525">
                   <a:solidFill>
                     <a:srgbClr val="000000"/>
                   </a:solidFill>
@@ -594,7 +594,7 @@
             </a:ln>
             <a:extLst>
               <a:ext uri="{91240B29-F687-4f45-9708-019B960494DF}">
-                <a14:hiddenLine xmlns="" xmlns:a14="http://schemas.microsoft.com/office/drawing/2010/main" w="9525">
+                <a14:hiddenLine xmlns:a14="http://schemas.microsoft.com/office/drawing/2010/main" xmlns="" w="9525">
                   <a:solidFill>
                     <a:srgbClr val="000000"/>
                   </a:solidFill>
@@ -656,7 +656,7 @@
             </a:ln>
             <a:extLst>
               <a:ext uri="{91240B29-F687-4f45-9708-019B960494DF}">
-                <a14:hiddenLine xmlns="" xmlns:a14="http://schemas.microsoft.com/office/drawing/2010/main" w="9525">
+                <a14:hiddenLine xmlns:a14="http://schemas.microsoft.com/office/drawing/2010/main" xmlns="" w="9525">
                   <a:solidFill>
                     <a:srgbClr val="000000"/>
                   </a:solidFill>
@@ -746,7 +746,7 @@
             </a:ln>
             <a:extLst>
               <a:ext uri="{91240B29-F687-4f45-9708-019B960494DF}">
-                <a14:hiddenLine xmlns="" xmlns:a14="http://schemas.microsoft.com/office/drawing/2010/main" w="9525">
+                <a14:hiddenLine xmlns:a14="http://schemas.microsoft.com/office/drawing/2010/main" xmlns="" w="9525">
                   <a:solidFill>
                     <a:srgbClr val="000000"/>
                   </a:solidFill>
@@ -808,7 +808,7 @@
             </a:ln>
             <a:extLst>
               <a:ext uri="{91240B29-F687-4f45-9708-019B960494DF}">
-                <a14:hiddenLine xmlns="" xmlns:a14="http://schemas.microsoft.com/office/drawing/2010/main" w="9525">
+                <a14:hiddenLine xmlns:a14="http://schemas.microsoft.com/office/drawing/2010/main" xmlns="" w="9525">
                   <a:solidFill>
                     <a:srgbClr val="000000"/>
                   </a:solidFill>
@@ -870,7 +870,7 @@
             </a:ln>
             <a:extLst>
               <a:ext uri="{91240B29-F687-4f45-9708-019B960494DF}">
-                <a14:hiddenLine xmlns="" xmlns:a14="http://schemas.microsoft.com/office/drawing/2010/main" w="9525">
+                <a14:hiddenLine xmlns:a14="http://schemas.microsoft.com/office/drawing/2010/main" xmlns="" w="9525">
                   <a:solidFill>
                     <a:srgbClr val="000000"/>
                   </a:solidFill>
@@ -960,7 +960,7 @@
             </a:ln>
             <a:extLst>
               <a:ext uri="{91240B29-F687-4f45-9708-019B960494DF}">
-                <a14:hiddenLine xmlns="" xmlns:a14="http://schemas.microsoft.com/office/drawing/2010/main" w="9525">
+                <a14:hiddenLine xmlns:a14="http://schemas.microsoft.com/office/drawing/2010/main" xmlns="" w="9525">
                   <a:solidFill>
                     <a:srgbClr val="000000"/>
                   </a:solidFill>
@@ -1050,7 +1050,7 @@
             </a:ln>
             <a:extLst>
               <a:ext uri="{91240B29-F687-4f45-9708-019B960494DF}">
-                <a14:hiddenLine xmlns="" xmlns:a14="http://schemas.microsoft.com/office/drawing/2010/main" w="9525">
+                <a14:hiddenLine xmlns:a14="http://schemas.microsoft.com/office/drawing/2010/main" xmlns="" w="9525">
                   <a:solidFill>
                     <a:srgbClr val="000000"/>
                   </a:solidFill>
@@ -1112,7 +1112,7 @@
             </a:ln>
             <a:extLst>
               <a:ext uri="{91240B29-F687-4f45-9708-019B960494DF}">
-                <a14:hiddenLine xmlns="" xmlns:a14="http://schemas.microsoft.com/office/drawing/2010/main" w="9525">
+                <a14:hiddenLine xmlns:a14="http://schemas.microsoft.com/office/drawing/2010/main" xmlns="" w="9525">
                   <a:solidFill>
                     <a:srgbClr val="000000"/>
                   </a:solidFill>
@@ -1222,7 +1222,7 @@
             </a:ln>
             <a:extLst>
               <a:ext uri="{91240B29-F687-4f45-9708-019B960494DF}">
-                <a14:hiddenLine xmlns="" xmlns:a14="http://schemas.microsoft.com/office/drawing/2010/main" w="9525">
+                <a14:hiddenLine xmlns:a14="http://schemas.microsoft.com/office/drawing/2010/main" xmlns="" w="9525">
                   <a:solidFill>
                     <a:srgbClr val="000000"/>
                   </a:solidFill>
@@ -1284,7 +1284,7 @@
             </a:ln>
             <a:extLst>
               <a:ext uri="{91240B29-F687-4f45-9708-019B960494DF}">
-                <a14:hiddenLine xmlns="" xmlns:a14="http://schemas.microsoft.com/office/drawing/2010/main" w="9525">
+                <a14:hiddenLine xmlns:a14="http://schemas.microsoft.com/office/drawing/2010/main" xmlns="" w="9525">
                   <a:solidFill>
                     <a:srgbClr val="000000"/>
                   </a:solidFill>
@@ -1374,7 +1374,7 @@
             </a:ln>
             <a:extLst>
               <a:ext uri="{91240B29-F687-4f45-9708-019B960494DF}">
-                <a14:hiddenLine xmlns="" xmlns:a14="http://schemas.microsoft.com/office/drawing/2010/main" w="9525">
+                <a14:hiddenLine xmlns:a14="http://schemas.microsoft.com/office/drawing/2010/main" xmlns="" w="9525">
                   <a:solidFill>
                     <a:srgbClr val="000000"/>
                   </a:solidFill>
@@ -1464,7 +1464,7 @@
             </a:ln>
             <a:extLst>
               <a:ext uri="{91240B29-F687-4f45-9708-019B960494DF}">
-                <a14:hiddenLine xmlns="" xmlns:a14="http://schemas.microsoft.com/office/drawing/2010/main" w="9525">
+                <a14:hiddenLine xmlns:a14="http://schemas.microsoft.com/office/drawing/2010/main" xmlns="" w="9525">
                   <a:solidFill>
                     <a:srgbClr val="000000"/>
                   </a:solidFill>
@@ -1526,7 +1526,7 @@
             </a:ln>
             <a:extLst>
               <a:ext uri="{91240B29-F687-4f45-9708-019B960494DF}">
-                <a14:hiddenLine xmlns="" xmlns:a14="http://schemas.microsoft.com/office/drawing/2010/main" w="9525">
+                <a14:hiddenLine xmlns:a14="http://schemas.microsoft.com/office/drawing/2010/main" xmlns="" w="9525">
                   <a:solidFill>
                     <a:srgbClr val="000000"/>
                   </a:solidFill>
@@ -1616,7 +1616,7 @@
             </a:ln>
             <a:extLst>
               <a:ext uri="{91240B29-F687-4f45-9708-019B960494DF}">
-                <a14:hiddenLine xmlns="" xmlns:a14="http://schemas.microsoft.com/office/drawing/2010/main" w="9525">
+                <a14:hiddenLine xmlns:a14="http://schemas.microsoft.com/office/drawing/2010/main" xmlns="" w="9525">
                   <a:solidFill>
                     <a:srgbClr val="000000"/>
                   </a:solidFill>
@@ -1706,7 +1706,7 @@
             </a:ln>
             <a:extLst>
               <a:ext uri="{91240B29-F687-4f45-9708-019B960494DF}">
-                <a14:hiddenLine xmlns="" xmlns:a14="http://schemas.microsoft.com/office/drawing/2010/main" w="9525">
+                <a14:hiddenLine xmlns:a14="http://schemas.microsoft.com/office/drawing/2010/main" xmlns="" w="9525">
                   <a:solidFill>
                     <a:srgbClr val="000000"/>
                   </a:solidFill>
@@ -1762,7 +1762,7 @@
             </a:ln>
             <a:extLst>
               <a:ext uri="{91240B29-F687-4f45-9708-019B960494DF}">
-                <a14:hiddenLine xmlns="" xmlns:a14="http://schemas.microsoft.com/office/drawing/2010/main" w="9525">
+                <a14:hiddenLine xmlns:a14="http://schemas.microsoft.com/office/drawing/2010/main" xmlns="" w="9525">
                   <a:solidFill>
                     <a:srgbClr val="000000"/>
                   </a:solidFill>
@@ -1852,7 +1852,7 @@
             </a:ln>
             <a:extLst>
               <a:ext uri="{91240B29-F687-4f45-9708-019B960494DF}">
-                <a14:hiddenLine xmlns="" xmlns:a14="http://schemas.microsoft.com/office/drawing/2010/main" w="9525">
+                <a14:hiddenLine xmlns:a14="http://schemas.microsoft.com/office/drawing/2010/main" xmlns="" w="9525">
                   <a:solidFill>
                     <a:srgbClr val="000000"/>
                   </a:solidFill>
@@ -1908,7 +1908,7 @@
             </a:ln>
             <a:extLst>
               <a:ext uri="{91240B29-F687-4f45-9708-019B960494DF}">
-                <a14:hiddenLine xmlns="" xmlns:a14="http://schemas.microsoft.com/office/drawing/2010/main" w="9525">
+                <a14:hiddenLine xmlns:a14="http://schemas.microsoft.com/office/drawing/2010/main" xmlns="" w="9525">
                   <a:solidFill>
                     <a:srgbClr val="000000"/>
                   </a:solidFill>
@@ -1998,7 +1998,7 @@
             </a:ln>
             <a:extLst>
               <a:ext uri="{91240B29-F687-4f45-9708-019B960494DF}">
-                <a14:hiddenLine xmlns="" xmlns:a14="http://schemas.microsoft.com/office/drawing/2010/main" w="9525">
+                <a14:hiddenLine xmlns:a14="http://schemas.microsoft.com/office/drawing/2010/main" xmlns="" w="9525">
                   <a:solidFill>
                     <a:srgbClr val="000000"/>
                   </a:solidFill>
@@ -2066,7 +2066,7 @@
             </a:ln>
             <a:extLst>
               <a:ext uri="{91240B29-F687-4f45-9708-019B960494DF}">
-                <a14:hiddenLine xmlns="" xmlns:a14="http://schemas.microsoft.com/office/drawing/2010/main" w="9525">
+                <a14:hiddenLine xmlns:a14="http://schemas.microsoft.com/office/drawing/2010/main" xmlns="" w="9525">
                   <a:solidFill>
                     <a:srgbClr val="000000"/>
                   </a:solidFill>
@@ -2156,7 +2156,7 @@
             </a:ln>
             <a:extLst>
               <a:ext uri="{91240B29-F687-4f45-9708-019B960494DF}">
-                <a14:hiddenLine xmlns="" xmlns:a14="http://schemas.microsoft.com/office/drawing/2010/main" w="9525">
+                <a14:hiddenLine xmlns:a14="http://schemas.microsoft.com/office/drawing/2010/main" xmlns="" w="9525">
                   <a:solidFill>
                     <a:srgbClr val="000000"/>
                   </a:solidFill>
@@ -2224,7 +2224,7 @@
             </a:ln>
             <a:extLst>
               <a:ext uri="{91240B29-F687-4f45-9708-019B960494DF}">
-                <a14:hiddenLine xmlns="" xmlns:a14="http://schemas.microsoft.com/office/drawing/2010/main" w="9525">
+                <a14:hiddenLine xmlns:a14="http://schemas.microsoft.com/office/drawing/2010/main" xmlns="" w="9525">
                   <a:solidFill>
                     <a:srgbClr val="000000"/>
                   </a:solidFill>
@@ -2314,7 +2314,7 @@
             </a:ln>
             <a:extLst>
               <a:ext uri="{91240B29-F687-4f45-9708-019B960494DF}">
-                <a14:hiddenLine xmlns="" xmlns:a14="http://schemas.microsoft.com/office/drawing/2010/main" w="9525">
+                <a14:hiddenLine xmlns:a14="http://schemas.microsoft.com/office/drawing/2010/main" xmlns="" w="9525">
                   <a:solidFill>
                     <a:srgbClr val="000000"/>
                   </a:solidFill>
@@ -2348,7 +2348,7 @@
             </a:ln>
             <a:extLst>
               <a:ext uri="{91240B29-F687-4f45-9708-019B960494DF}">
-                <a14:hiddenLine xmlns="" xmlns:a14="http://schemas.microsoft.com/office/drawing/2010/main" w="9525">
+                <a14:hiddenLine xmlns:a14="http://schemas.microsoft.com/office/drawing/2010/main" xmlns="" w="9525">
                   <a:solidFill>
                     <a:srgbClr val="000000"/>
                   </a:solidFill>
@@ -2438,7 +2438,7 @@
             </a:ln>
             <a:extLst>
               <a:ext uri="{91240B29-F687-4f45-9708-019B960494DF}">
-                <a14:hiddenLine xmlns="" xmlns:a14="http://schemas.microsoft.com/office/drawing/2010/main" w="9525">
+                <a14:hiddenLine xmlns:a14="http://schemas.microsoft.com/office/drawing/2010/main" xmlns="" w="9525">
                   <a:solidFill>
                     <a:srgbClr val="000000"/>
                   </a:solidFill>
@@ -2500,7 +2500,7 @@
             </a:ln>
             <a:extLst>
               <a:ext uri="{91240B29-F687-4f45-9708-019B960494DF}">
-                <a14:hiddenLine xmlns="" xmlns:a14="http://schemas.microsoft.com/office/drawing/2010/main" w="9525">
+                <a14:hiddenLine xmlns:a14="http://schemas.microsoft.com/office/drawing/2010/main" xmlns="" w="9525">
                   <a:solidFill>
                     <a:srgbClr val="000000"/>
                   </a:solidFill>
@@ -2562,7 +2562,7 @@
             </a:ln>
             <a:extLst>
               <a:ext uri="{91240B29-F687-4f45-9708-019B960494DF}">
-                <a14:hiddenLine xmlns="" xmlns:a14="http://schemas.microsoft.com/office/drawing/2010/main" w="9525">
+                <a14:hiddenLine xmlns:a14="http://schemas.microsoft.com/office/drawing/2010/main" xmlns="" w="9525">
                   <a:solidFill>
                     <a:srgbClr val="000000"/>
                   </a:solidFill>
@@ -2652,7 +2652,7 @@
             </a:ln>
             <a:extLst>
               <a:ext uri="{91240B29-F687-4f45-9708-019B960494DF}">
-                <a14:hiddenLine xmlns="" xmlns:a14="http://schemas.microsoft.com/office/drawing/2010/main" w="9525">
+                <a14:hiddenLine xmlns:a14="http://schemas.microsoft.com/office/drawing/2010/main" xmlns="" w="9525">
                   <a:solidFill>
                     <a:srgbClr val="000000"/>
                   </a:solidFill>
@@ -2720,7 +2720,7 @@
             </a:ln>
             <a:extLst>
               <a:ext uri="{91240B29-F687-4f45-9708-019B960494DF}">
-                <a14:hiddenLine xmlns="" xmlns:a14="http://schemas.microsoft.com/office/drawing/2010/main" w="9525">
+                <a14:hiddenLine xmlns:a14="http://schemas.microsoft.com/office/drawing/2010/main" xmlns="" w="9525">
                   <a:solidFill>
                     <a:srgbClr val="000000"/>
                   </a:solidFill>
@@ -2782,7 +2782,7 @@
             </a:ln>
             <a:extLst>
               <a:ext uri="{91240B29-F687-4f45-9708-019B960494DF}">
-                <a14:hiddenLine xmlns="" xmlns:a14="http://schemas.microsoft.com/office/drawing/2010/main" w="9525">
+                <a14:hiddenLine xmlns:a14="http://schemas.microsoft.com/office/drawing/2010/main" xmlns="" w="9525">
                   <a:solidFill>
                     <a:srgbClr val="000000"/>
                   </a:solidFill>
@@ -2872,7 +2872,7 @@
             </a:ln>
             <a:extLst>
               <a:ext uri="{91240B29-F687-4f45-9708-019B960494DF}">
-                <a14:hiddenLine xmlns="" xmlns:a14="http://schemas.microsoft.com/office/drawing/2010/main" w="9525">
+                <a14:hiddenLine xmlns:a14="http://schemas.microsoft.com/office/drawing/2010/main" xmlns="" w="9525">
                   <a:solidFill>
                     <a:srgbClr val="000000"/>
                   </a:solidFill>
@@ -2934,7 +2934,7 @@
             </a:ln>
             <a:extLst>
               <a:ext uri="{91240B29-F687-4f45-9708-019B960494DF}">
-                <a14:hiddenLine xmlns="" xmlns:a14="http://schemas.microsoft.com/office/drawing/2010/main" w="9525">
+                <a14:hiddenLine xmlns:a14="http://schemas.microsoft.com/office/drawing/2010/main" xmlns="" w="9525">
                   <a:solidFill>
                     <a:srgbClr val="000000"/>
                   </a:solidFill>
@@ -3024,7 +3024,7 @@
             </a:ln>
             <a:extLst>
               <a:ext uri="{91240B29-F687-4f45-9708-019B960494DF}">
-                <a14:hiddenLine xmlns="" xmlns:a14="http://schemas.microsoft.com/office/drawing/2010/main" w="9525">
+                <a14:hiddenLine xmlns:a14="http://schemas.microsoft.com/office/drawing/2010/main" xmlns="" w="9525">
                   <a:solidFill>
                     <a:srgbClr val="000000"/>
                   </a:solidFill>
@@ -3086,7 +3086,7 @@
             </a:ln>
             <a:extLst>
               <a:ext uri="{91240B29-F687-4f45-9708-019B960494DF}">
-                <a14:hiddenLine xmlns="" xmlns:a14="http://schemas.microsoft.com/office/drawing/2010/main" w="9525">
+                <a14:hiddenLine xmlns:a14="http://schemas.microsoft.com/office/drawing/2010/main" xmlns="" w="9525">
                   <a:solidFill>
                     <a:srgbClr val="000000"/>
                   </a:solidFill>
@@ -3176,7 +3176,7 @@
             </a:ln>
             <a:extLst>
               <a:ext uri="{91240B29-F687-4f45-9708-019B960494DF}">
-                <a14:hiddenLine xmlns="" xmlns:a14="http://schemas.microsoft.com/office/drawing/2010/main" w="9525">
+                <a14:hiddenLine xmlns:a14="http://schemas.microsoft.com/office/drawing/2010/main" xmlns="" w="9525">
                   <a:solidFill>
                     <a:srgbClr val="000000"/>
                   </a:solidFill>
@@ -3210,7 +3210,7 @@
             </a:ln>
             <a:extLst>
               <a:ext uri="{91240B29-F687-4f45-9708-019B960494DF}">
-                <a14:hiddenLine xmlns="" xmlns:a14="http://schemas.microsoft.com/office/drawing/2010/main" w="9525">
+                <a14:hiddenLine xmlns:a14="http://schemas.microsoft.com/office/drawing/2010/main" xmlns="" w="9525">
                   <a:solidFill>
                     <a:srgbClr val="000000"/>
                   </a:solidFill>
@@ -3275,7 +3275,7 @@
             </a:ln>
             <a:extLst>
               <a:ext uri="{91240B29-F687-4f45-9708-019B960494DF}">
-                <a14:hiddenLine xmlns="" xmlns:a14="http://schemas.microsoft.com/office/drawing/2010/main" w="9525">
+                <a14:hiddenLine xmlns:a14="http://schemas.microsoft.com/office/drawing/2010/main" xmlns="" w="9525">
                   <a:solidFill>
                     <a:srgbClr val="000000"/>
                   </a:solidFill>
@@ -3365,7 +3365,7 @@
             </a:ln>
             <a:extLst>
               <a:ext uri="{91240B29-F687-4f45-9708-019B960494DF}">
-                <a14:hiddenLine xmlns="" xmlns:a14="http://schemas.microsoft.com/office/drawing/2010/main" w="9525">
+                <a14:hiddenLine xmlns:a14="http://schemas.microsoft.com/office/drawing/2010/main" xmlns="" w="9525">
                   <a:solidFill>
                     <a:srgbClr val="000000"/>
                   </a:solidFill>
@@ -3427,7 +3427,7 @@
             </a:ln>
             <a:extLst>
               <a:ext uri="{91240B29-F687-4f45-9708-019B960494DF}">
-                <a14:hiddenLine xmlns="" xmlns:a14="http://schemas.microsoft.com/office/drawing/2010/main" w="9525">
+                <a14:hiddenLine xmlns:a14="http://schemas.microsoft.com/office/drawing/2010/main" xmlns="" w="9525">
                   <a:solidFill>
                     <a:srgbClr val="000000"/>
                   </a:solidFill>
@@ -3517,7 +3517,7 @@
             </a:ln>
             <a:extLst>
               <a:ext uri="{91240B29-F687-4f45-9708-019B960494DF}">
-                <a14:hiddenLine xmlns="" xmlns:a14="http://schemas.microsoft.com/office/drawing/2010/main" w="9525">
+                <a14:hiddenLine xmlns:a14="http://schemas.microsoft.com/office/drawing/2010/main" xmlns="" w="9525">
                   <a:solidFill>
                     <a:srgbClr val="000000"/>
                   </a:solidFill>
@@ -3607,7 +3607,7 @@
             </a:ln>
             <a:extLst>
               <a:ext uri="{91240B29-F687-4f45-9708-019B960494DF}">
-                <a14:hiddenLine xmlns="" xmlns:a14="http://schemas.microsoft.com/office/drawing/2010/main" w="9525">
+                <a14:hiddenLine xmlns:a14="http://schemas.microsoft.com/office/drawing/2010/main" xmlns="" w="9525">
                   <a:solidFill>
                     <a:srgbClr val="000000"/>
                   </a:solidFill>
@@ -3672,7 +3672,7 @@
             </a:ln>
             <a:extLst>
               <a:ext uri="{91240B29-F687-4f45-9708-019B960494DF}">
-                <a14:hiddenLine xmlns="" xmlns:a14="http://schemas.microsoft.com/office/drawing/2010/main" w="9525">
+                <a14:hiddenLine xmlns:a14="http://schemas.microsoft.com/office/drawing/2010/main" xmlns="" w="9525">
                   <a:solidFill>
                     <a:srgbClr val="000000"/>
                   </a:solidFill>
@@ -3734,7 +3734,7 @@
             </a:ln>
             <a:extLst>
               <a:ext uri="{91240B29-F687-4f45-9708-019B960494DF}">
-                <a14:hiddenLine xmlns="" xmlns:a14="http://schemas.microsoft.com/office/drawing/2010/main" w="9525">
+                <a14:hiddenLine xmlns:a14="http://schemas.microsoft.com/office/drawing/2010/main" xmlns="" w="9525">
                   <a:solidFill>
                     <a:srgbClr val="000000"/>
                   </a:solidFill>
@@ -3824,7 +3824,7 @@
             </a:ln>
             <a:extLst>
               <a:ext uri="{91240B29-F687-4f45-9708-019B960494DF}">
-                <a14:hiddenLine xmlns="" xmlns:a14="http://schemas.microsoft.com/office/drawing/2010/main" w="9525">
+                <a14:hiddenLine xmlns:a14="http://schemas.microsoft.com/office/drawing/2010/main" xmlns="" w="9525">
                   <a:solidFill>
                     <a:srgbClr val="000000"/>
                   </a:solidFill>
@@ -3914,7 +3914,7 @@
             </a:ln>
             <a:extLst>
               <a:ext uri="{91240B29-F687-4f45-9708-019B960494DF}">
-                <a14:hiddenLine xmlns="" xmlns:a14="http://schemas.microsoft.com/office/drawing/2010/main" w="9525">
+                <a14:hiddenLine xmlns:a14="http://schemas.microsoft.com/office/drawing/2010/main" xmlns="" w="9525">
                   <a:solidFill>
                     <a:srgbClr val="000000"/>
                   </a:solidFill>
@@ -3976,7 +3976,7 @@
             </a:ln>
             <a:extLst>
               <a:ext uri="{91240B29-F687-4f45-9708-019B960494DF}">
-                <a14:hiddenLine xmlns="" xmlns:a14="http://schemas.microsoft.com/office/drawing/2010/main" w="9525">
+                <a14:hiddenLine xmlns:a14="http://schemas.microsoft.com/office/drawing/2010/main" xmlns="" w="9525">
                   <a:solidFill>
                     <a:srgbClr val="000000"/>
                   </a:solidFill>
@@ -4096,7 +4096,7 @@
             </a:ln>
             <a:extLst>
               <a:ext uri="{91240B29-F687-4f45-9708-019B960494DF}">
-                <a14:hiddenLine xmlns="" xmlns:a14="http://schemas.microsoft.com/office/drawing/2010/main" w="9525">
+                <a14:hiddenLine xmlns:a14="http://schemas.microsoft.com/office/drawing/2010/main" xmlns="" w="9525">
                   <a:solidFill>
                     <a:srgbClr val="000000"/>
                   </a:solidFill>
@@ -4164,7 +4164,7 @@
             </a:ln>
             <a:extLst>
               <a:ext uri="{91240B29-F687-4f45-9708-019B960494DF}">
-                <a14:hiddenLine xmlns="" xmlns:a14="http://schemas.microsoft.com/office/drawing/2010/main" w="9525">
+                <a14:hiddenLine xmlns:a14="http://schemas.microsoft.com/office/drawing/2010/main" xmlns="" w="9525">
                   <a:solidFill>
                     <a:srgbClr val="000000"/>
                   </a:solidFill>
@@ -4254,7 +4254,7 @@
             </a:ln>
             <a:extLst>
               <a:ext uri="{91240B29-F687-4f45-9708-019B960494DF}">
-                <a14:hiddenLine xmlns="" xmlns:a14="http://schemas.microsoft.com/office/drawing/2010/main" w="9525">
+                <a14:hiddenLine xmlns:a14="http://schemas.microsoft.com/office/drawing/2010/main" xmlns="" w="9525">
                   <a:solidFill>
                     <a:srgbClr val="000000"/>
                   </a:solidFill>
@@ -4394,7 +4394,7 @@
           <a:p>
             <a:fld id="{48A87A34-81AB-432B-8DAE-1953F412C126}" type="datetimeFigureOut">
               <a:rPr lang="en-US" dirty="0"/>
-              <a:t>5/5/19</a:t>
+              <a:t>5/12/2019</a:t>
             </a:fld>
             <a:endParaRPr lang="en-US" dirty="0"/>
           </a:p>
@@ -4446,7 +4446,7 @@
           <a:p>
             <a:fld id="{6D22F896-40B5-4ADD-8801-0D06FADFA095}" type="slidenum">
               <a:rPr lang="en-US" dirty="0"/>
-              <a:t>‹Nr.›</a:t>
+              <a:t>‹#›</a:t>
             </a:fld>
             <a:endParaRPr lang="en-US" dirty="0"/>
           </a:p>
@@ -4656,7 +4656,7 @@
           <a:p>
             <a:fld id="{48A87A34-81AB-432B-8DAE-1953F412C126}" type="datetimeFigureOut">
               <a:rPr lang="en-US" dirty="0"/>
-              <a:t>5/5/19</a:t>
+              <a:t>5/12/2019</a:t>
             </a:fld>
             <a:endParaRPr lang="en-US" dirty="0"/>
           </a:p>
@@ -4698,7 +4698,7 @@
           <a:p>
             <a:fld id="{6D22F896-40B5-4ADD-8801-0D06FADFA095}" type="slidenum">
               <a:rPr lang="en-US" dirty="0"/>
-              <a:t>‹Nr.›</a:t>
+              <a:t>‹#›</a:t>
             </a:fld>
             <a:endParaRPr lang="en-US" dirty="0"/>
           </a:p>
@@ -4847,7 +4847,7 @@
           <a:p>
             <a:fld id="{48A87A34-81AB-432B-8DAE-1953F412C126}" type="datetimeFigureOut">
               <a:rPr lang="en-US" dirty="0"/>
-              <a:t>5/5/19</a:t>
+              <a:t>5/12/2019</a:t>
             </a:fld>
             <a:endParaRPr lang="en-US" dirty="0"/>
           </a:p>
@@ -4889,7 +4889,7 @@
           <a:p>
             <a:fld id="{6D22F896-40B5-4ADD-8801-0D06FADFA095}" type="slidenum">
               <a:rPr lang="en-US" dirty="0"/>
-              <a:t>‹Nr.›</a:t>
+              <a:t>‹#›</a:t>
             </a:fld>
             <a:endParaRPr lang="en-US" dirty="0"/>
           </a:p>
@@ -5105,7 +5105,7 @@
           <a:p>
             <a:fld id="{48A87A34-81AB-432B-8DAE-1953F412C126}" type="datetimeFigureOut">
               <a:rPr lang="en-US" dirty="0"/>
-              <a:t>5/5/19</a:t>
+              <a:t>5/12/2019</a:t>
             </a:fld>
             <a:endParaRPr lang="en-US" dirty="0"/>
           </a:p>
@@ -5147,7 +5147,7 @@
           <a:p>
             <a:fld id="{6D22F896-40B5-4ADD-8801-0D06FADFA095}" type="slidenum">
               <a:rPr lang="en-US" dirty="0"/>
-              <a:t>‹Nr.›</a:t>
+              <a:t>‹#›</a:t>
             </a:fld>
             <a:endParaRPr lang="en-US" dirty="0"/>
           </a:p>
@@ -5534,7 +5534,7 @@
           <a:p>
             <a:fld id="{48A87A34-81AB-432B-8DAE-1953F412C126}" type="datetimeFigureOut">
               <a:rPr lang="en-US" dirty="0"/>
-              <a:t>5/5/19</a:t>
+              <a:t>5/12/2019</a:t>
             </a:fld>
             <a:endParaRPr lang="en-US" dirty="0"/>
           </a:p>
@@ -5576,7 +5576,7 @@
           <a:p>
             <a:fld id="{6D22F896-40B5-4ADD-8801-0D06FADFA095}" type="slidenum">
               <a:rPr lang="en-US" dirty="0"/>
-              <a:t>‹Nr.›</a:t>
+              <a:t>‹#›</a:t>
             </a:fld>
             <a:endParaRPr lang="en-US" dirty="0"/>
           </a:p>
@@ -6075,7 +6075,7 @@
           <a:p>
             <a:fld id="{48A87A34-81AB-432B-8DAE-1953F412C126}" type="datetimeFigureOut">
               <a:rPr lang="en-US" dirty="0"/>
-              <a:t>5/5/19</a:t>
+              <a:t>5/12/2019</a:t>
             </a:fld>
             <a:endParaRPr lang="en-US" dirty="0"/>
           </a:p>
@@ -6117,7 +6117,7 @@
           <a:p>
             <a:fld id="{6D22F896-40B5-4ADD-8801-0D06FADFA095}" type="slidenum">
               <a:rPr lang="en-US" dirty="0"/>
-              <a:t>‹Nr.›</a:t>
+              <a:t>‹#›</a:t>
             </a:fld>
             <a:endParaRPr lang="en-US" dirty="0"/>
           </a:p>
@@ -6790,7 +6790,7 @@
           <a:p>
             <a:fld id="{48A87A34-81AB-432B-8DAE-1953F412C126}" type="datetimeFigureOut">
               <a:rPr lang="en-US" dirty="0"/>
-              <a:t>5/5/19</a:t>
+              <a:t>5/12/2019</a:t>
             </a:fld>
             <a:endParaRPr lang="en-US" dirty="0"/>
           </a:p>
@@ -6832,7 +6832,7 @@
           <a:p>
             <a:fld id="{6D22F896-40B5-4ADD-8801-0D06FADFA095}" type="slidenum">
               <a:rPr lang="en-US" dirty="0"/>
-              <a:t>‹Nr.›</a:t>
+              <a:t>‹#›</a:t>
             </a:fld>
             <a:endParaRPr lang="en-US" dirty="0"/>
           </a:p>
@@ -6955,7 +6955,7 @@
           <a:p>
             <a:fld id="{48A87A34-81AB-432B-8DAE-1953F412C126}" type="datetimeFigureOut">
               <a:rPr lang="en-US" dirty="0"/>
-              <a:t>5/5/19</a:t>
+              <a:t>5/12/2019</a:t>
             </a:fld>
             <a:endParaRPr lang="en-US" dirty="0"/>
           </a:p>
@@ -6997,7 +6997,7 @@
           <a:p>
             <a:fld id="{6D22F896-40B5-4ADD-8801-0D06FADFA095}" type="slidenum">
               <a:rPr lang="en-US" dirty="0"/>
-              <a:t>‹Nr.›</a:t>
+              <a:t>‹#›</a:t>
             </a:fld>
             <a:endParaRPr lang="en-US" dirty="0"/>
           </a:p>
@@ -7130,7 +7130,7 @@
           <a:p>
             <a:fld id="{48A87A34-81AB-432B-8DAE-1953F412C126}" type="datetimeFigureOut">
               <a:rPr lang="en-US" dirty="0"/>
-              <a:t>5/5/19</a:t>
+              <a:t>5/12/2019</a:t>
             </a:fld>
             <a:endParaRPr lang="en-US" dirty="0"/>
           </a:p>
@@ -7172,7 +7172,7 @@
           <a:p>
             <a:fld id="{6D22F896-40B5-4ADD-8801-0D06FADFA095}" type="slidenum">
               <a:rPr lang="en-US" dirty="0"/>
-              <a:t>‹Nr.›</a:t>
+              <a:t>‹#›</a:t>
             </a:fld>
             <a:endParaRPr lang="en-US" dirty="0"/>
           </a:p>
@@ -7295,7 +7295,7 @@
           <a:p>
             <a:fld id="{48A87A34-81AB-432B-8DAE-1953F412C126}" type="datetimeFigureOut">
               <a:rPr lang="en-US" dirty="0"/>
-              <a:t>5/5/19</a:t>
+              <a:t>5/12/2019</a:t>
             </a:fld>
             <a:endParaRPr lang="en-US" dirty="0"/>
           </a:p>
@@ -7337,7 +7337,7 @@
           <a:p>
             <a:fld id="{6D22F896-40B5-4ADD-8801-0D06FADFA095}" type="slidenum">
               <a:rPr lang="en-US" dirty="0"/>
-              <a:t>‹Nr.›</a:t>
+              <a:t>‹#›</a:t>
             </a:fld>
             <a:endParaRPr lang="en-US" dirty="0"/>
           </a:p>
@@ -7540,7 +7540,7 @@
           <a:p>
             <a:fld id="{48A87A34-81AB-432B-8DAE-1953F412C126}" type="datetimeFigureOut">
               <a:rPr lang="en-US" dirty="0"/>
-              <a:t>5/5/19</a:t>
+              <a:t>5/12/2019</a:t>
             </a:fld>
             <a:endParaRPr lang="en-US" dirty="0"/>
           </a:p>
@@ -7582,7 +7582,7 @@
           <a:p>
             <a:fld id="{6D22F896-40B5-4ADD-8801-0D06FADFA095}" type="slidenum">
               <a:rPr lang="en-US" dirty="0"/>
-              <a:t>‹Nr.›</a:t>
+              <a:t>‹#›</a:t>
             </a:fld>
             <a:endParaRPr lang="en-US" dirty="0"/>
           </a:p>
@@ -7767,7 +7767,7 @@
           <a:p>
             <a:fld id="{48A87A34-81AB-432B-8DAE-1953F412C126}" type="datetimeFigureOut">
               <a:rPr lang="en-US" dirty="0"/>
-              <a:t>5/5/19</a:t>
+              <a:t>5/12/2019</a:t>
             </a:fld>
             <a:endParaRPr lang="en-US" dirty="0"/>
           </a:p>
@@ -7809,7 +7809,7 @@
           <a:p>
             <a:fld id="{6D22F896-40B5-4ADD-8801-0D06FADFA095}" type="slidenum">
               <a:rPr lang="en-US" dirty="0"/>
-              <a:t>‹Nr.›</a:t>
+              <a:t>‹#›</a:t>
             </a:fld>
             <a:endParaRPr lang="en-US" dirty="0"/>
           </a:p>
@@ -8143,7 +8143,7 @@
           <a:p>
             <a:fld id="{48A87A34-81AB-432B-8DAE-1953F412C126}" type="datetimeFigureOut">
               <a:rPr lang="en-US" dirty="0"/>
-              <a:t>5/5/19</a:t>
+              <a:t>5/12/2019</a:t>
             </a:fld>
             <a:endParaRPr lang="en-US" dirty="0"/>
           </a:p>
@@ -8185,7 +8185,7 @@
           <a:p>
             <a:fld id="{6D22F896-40B5-4ADD-8801-0D06FADFA095}" type="slidenum">
               <a:rPr lang="en-US" dirty="0"/>
-              <a:t>‹Nr.›</a:t>
+              <a:t>‹#›</a:t>
             </a:fld>
             <a:endParaRPr lang="en-US" dirty="0"/>
           </a:p>
@@ -8256,7 +8256,7 @@
           <a:p>
             <a:fld id="{48A87A34-81AB-432B-8DAE-1953F412C126}" type="datetimeFigureOut">
               <a:rPr lang="en-US" dirty="0"/>
-              <a:t>5/5/19</a:t>
+              <a:t>5/12/2019</a:t>
             </a:fld>
             <a:endParaRPr lang="en-US" dirty="0"/>
           </a:p>
@@ -8298,7 +8298,7 @@
           <a:p>
             <a:fld id="{6D22F896-40B5-4ADD-8801-0D06FADFA095}" type="slidenum">
               <a:rPr lang="en-US" dirty="0"/>
-              <a:t>‹Nr.›</a:t>
+              <a:t>‹#›</a:t>
             </a:fld>
             <a:endParaRPr lang="en-US" dirty="0"/>
           </a:p>
@@ -8346,7 +8346,7 @@
           <a:p>
             <a:fld id="{48A87A34-81AB-432B-8DAE-1953F412C126}" type="datetimeFigureOut">
               <a:rPr lang="en-US" dirty="0"/>
-              <a:t>5/5/19</a:t>
+              <a:t>5/12/2019</a:t>
             </a:fld>
             <a:endParaRPr lang="en-US" dirty="0"/>
           </a:p>
@@ -8388,7 +8388,7 @@
           <a:p>
             <a:fld id="{6D22F896-40B5-4ADD-8801-0D06FADFA095}" type="slidenum">
               <a:rPr lang="en-US" dirty="0"/>
-              <a:t>‹Nr.›</a:t>
+              <a:t>‹#›</a:t>
             </a:fld>
             <a:endParaRPr lang="en-US" dirty="0"/>
           </a:p>
@@ -8590,7 +8590,7 @@
           <a:p>
             <a:fld id="{48A87A34-81AB-432B-8DAE-1953F412C126}" type="datetimeFigureOut">
               <a:rPr lang="en-US" dirty="0"/>
-              <a:t>5/5/19</a:t>
+              <a:t>5/12/2019</a:t>
             </a:fld>
             <a:endParaRPr lang="en-US" dirty="0"/>
           </a:p>
@@ -8632,7 +8632,7 @@
           <a:p>
             <a:fld id="{6D22F896-40B5-4ADD-8801-0D06FADFA095}" type="slidenum">
               <a:rPr lang="en-US" dirty="0"/>
-              <a:t>‹Nr.›</a:t>
+              <a:t>‹#›</a:t>
             </a:fld>
             <a:endParaRPr lang="en-US" dirty="0"/>
           </a:p>
@@ -8865,7 +8865,7 @@
           <a:p>
             <a:fld id="{48A87A34-81AB-432B-8DAE-1953F412C126}" type="datetimeFigureOut">
               <a:rPr lang="en-US" dirty="0"/>
-              <a:t>5/5/19</a:t>
+              <a:t>5/12/2019</a:t>
             </a:fld>
             <a:endParaRPr lang="en-US" dirty="0"/>
           </a:p>
@@ -8907,7 +8907,7 @@
           <a:p>
             <a:fld id="{6D22F896-40B5-4ADD-8801-0D06FADFA095}" type="slidenum">
               <a:rPr lang="en-US" dirty="0"/>
-              <a:t>‹Nr.›</a:t>
+              <a:t>‹#›</a:t>
             </a:fld>
             <a:endParaRPr lang="en-US" dirty="0"/>
           </a:p>
@@ -8976,7 +8976,7 @@
           <a:noFill/>
           <a:extLst>
             <a:ext uri="{909E8E84-426E-40dd-AFC4-6F175D3DCCD1}">
-              <a14:hiddenFill xmlns="" xmlns:a14="http://schemas.microsoft.com/office/drawing/2010/main">
+              <a14:hiddenFill xmlns:a14="http://schemas.microsoft.com/office/drawing/2010/main" xmlns="">
                 <a:solidFill>
                   <a:srgbClr val="FFFFFF"/>
                 </a:solidFill>
@@ -9050,7 +9050,7 @@
               </a:ln>
               <a:extLst>
                 <a:ext uri="{91240B29-F687-4f45-9708-019B960494DF}">
-                  <a14:hiddenLine xmlns="" xmlns:a14="http://schemas.microsoft.com/office/drawing/2010/main" w="9525">
+                  <a14:hiddenLine xmlns:a14="http://schemas.microsoft.com/office/drawing/2010/main" xmlns="" w="9525">
                     <a:solidFill>
                       <a:srgbClr val="000000"/>
                     </a:solidFill>
@@ -9140,7 +9140,7 @@
               </a:ln>
               <a:extLst>
                 <a:ext uri="{91240B29-F687-4f45-9708-019B960494DF}">
-                  <a14:hiddenLine xmlns="" xmlns:a14="http://schemas.microsoft.com/office/drawing/2010/main" w="9525">
+                  <a14:hiddenLine xmlns:a14="http://schemas.microsoft.com/office/drawing/2010/main" xmlns="" w="9525">
                     <a:solidFill>
                       <a:srgbClr val="000000"/>
                     </a:solidFill>
@@ -9230,7 +9230,7 @@
               </a:ln>
               <a:extLst>
                 <a:ext uri="{91240B29-F687-4f45-9708-019B960494DF}">
-                  <a14:hiddenLine xmlns="" xmlns:a14="http://schemas.microsoft.com/office/drawing/2010/main" w="9525">
+                  <a14:hiddenLine xmlns:a14="http://schemas.microsoft.com/office/drawing/2010/main" xmlns="" w="9525">
                     <a:solidFill>
                       <a:srgbClr val="000000"/>
                     </a:solidFill>
@@ -9292,7 +9292,7 @@
               </a:ln>
               <a:extLst>
                 <a:ext uri="{91240B29-F687-4f45-9708-019B960494DF}">
-                  <a14:hiddenLine xmlns="" xmlns:a14="http://schemas.microsoft.com/office/drawing/2010/main" w="9525">
+                  <a14:hiddenLine xmlns:a14="http://schemas.microsoft.com/office/drawing/2010/main" xmlns="" w="9525">
                     <a:solidFill>
                       <a:srgbClr val="000000"/>
                     </a:solidFill>
@@ -9382,7 +9382,7 @@
               </a:ln>
               <a:extLst>
                 <a:ext uri="{91240B29-F687-4f45-9708-019B960494DF}">
-                  <a14:hiddenLine xmlns="" xmlns:a14="http://schemas.microsoft.com/office/drawing/2010/main" w="9525">
+                  <a14:hiddenLine xmlns:a14="http://schemas.microsoft.com/office/drawing/2010/main" xmlns="" w="9525">
                     <a:solidFill>
                       <a:srgbClr val="000000"/>
                     </a:solidFill>
@@ -9444,7 +9444,7 @@
               </a:ln>
               <a:extLst>
                 <a:ext uri="{91240B29-F687-4f45-9708-019B960494DF}">
-                  <a14:hiddenLine xmlns="" xmlns:a14="http://schemas.microsoft.com/office/drawing/2010/main" w="9525">
+                  <a14:hiddenLine xmlns:a14="http://schemas.microsoft.com/office/drawing/2010/main" xmlns="" w="9525">
                     <a:solidFill>
                       <a:srgbClr val="000000"/>
                     </a:solidFill>
@@ -9506,7 +9506,7 @@
               </a:ln>
               <a:extLst>
                 <a:ext uri="{91240B29-F687-4f45-9708-019B960494DF}">
-                  <a14:hiddenLine xmlns="" xmlns:a14="http://schemas.microsoft.com/office/drawing/2010/main" w="9525">
+                  <a14:hiddenLine xmlns:a14="http://schemas.microsoft.com/office/drawing/2010/main" xmlns="" w="9525">
                     <a:solidFill>
                       <a:srgbClr val="000000"/>
                     </a:solidFill>
@@ -9596,7 +9596,7 @@
               </a:ln>
               <a:extLst>
                 <a:ext uri="{91240B29-F687-4f45-9708-019B960494DF}">
-                  <a14:hiddenLine xmlns="" xmlns:a14="http://schemas.microsoft.com/office/drawing/2010/main" w="9525">
+                  <a14:hiddenLine xmlns:a14="http://schemas.microsoft.com/office/drawing/2010/main" xmlns="" w="9525">
                     <a:solidFill>
                       <a:srgbClr val="000000"/>
                     </a:solidFill>
@@ -9686,7 +9686,7 @@
               </a:ln>
               <a:extLst>
                 <a:ext uri="{91240B29-F687-4f45-9708-019B960494DF}">
-                  <a14:hiddenLine xmlns="" xmlns:a14="http://schemas.microsoft.com/office/drawing/2010/main" w="9525">
+                  <a14:hiddenLine xmlns:a14="http://schemas.microsoft.com/office/drawing/2010/main" xmlns="" w="9525">
                     <a:solidFill>
                       <a:srgbClr val="000000"/>
                     </a:solidFill>
@@ -9748,7 +9748,7 @@
               </a:ln>
               <a:extLst>
                 <a:ext uri="{91240B29-F687-4f45-9708-019B960494DF}">
-                  <a14:hiddenLine xmlns="" xmlns:a14="http://schemas.microsoft.com/office/drawing/2010/main" w="9525">
+                  <a14:hiddenLine xmlns:a14="http://schemas.microsoft.com/office/drawing/2010/main" xmlns="" w="9525">
                     <a:solidFill>
                       <a:srgbClr val="000000"/>
                     </a:solidFill>
@@ -9858,7 +9858,7 @@
               </a:ln>
               <a:extLst>
                 <a:ext uri="{91240B29-F687-4f45-9708-019B960494DF}">
-                  <a14:hiddenLine xmlns="" xmlns:a14="http://schemas.microsoft.com/office/drawing/2010/main" w="9525">
+                  <a14:hiddenLine xmlns:a14="http://schemas.microsoft.com/office/drawing/2010/main" xmlns="" w="9525">
                     <a:solidFill>
                       <a:srgbClr val="000000"/>
                     </a:solidFill>
@@ -9942,7 +9942,7 @@
               </a:ln>
               <a:extLst>
                 <a:ext uri="{91240B29-F687-4f45-9708-019B960494DF}">
-                  <a14:hiddenLine xmlns="" xmlns:a14="http://schemas.microsoft.com/office/drawing/2010/main" w="9525">
+                  <a14:hiddenLine xmlns:a14="http://schemas.microsoft.com/office/drawing/2010/main" xmlns="" w="9525">
                     <a:solidFill>
                       <a:srgbClr val="000000"/>
                     </a:solidFill>
@@ -10004,7 +10004,7 @@
               </a:ln>
               <a:extLst>
                 <a:ext uri="{91240B29-F687-4f45-9708-019B960494DF}">
-                  <a14:hiddenLine xmlns="" xmlns:a14="http://schemas.microsoft.com/office/drawing/2010/main" w="9525">
+                  <a14:hiddenLine xmlns:a14="http://schemas.microsoft.com/office/drawing/2010/main" xmlns="" w="9525">
                     <a:solidFill>
                       <a:srgbClr val="000000"/>
                     </a:solidFill>
@@ -10066,7 +10066,7 @@
               </a:ln>
               <a:extLst>
                 <a:ext uri="{91240B29-F687-4f45-9708-019B960494DF}">
-                  <a14:hiddenLine xmlns="" xmlns:a14="http://schemas.microsoft.com/office/drawing/2010/main" w="9525">
+                  <a14:hiddenLine xmlns:a14="http://schemas.microsoft.com/office/drawing/2010/main" xmlns="" w="9525">
                     <a:solidFill>
                       <a:srgbClr val="000000"/>
                     </a:solidFill>
@@ -10156,7 +10156,7 @@
               </a:ln>
               <a:extLst>
                 <a:ext uri="{91240B29-F687-4f45-9708-019B960494DF}">
-                  <a14:hiddenLine xmlns="" xmlns:a14="http://schemas.microsoft.com/office/drawing/2010/main" w="9525">
+                  <a14:hiddenLine xmlns:a14="http://schemas.microsoft.com/office/drawing/2010/main" xmlns="" w="9525">
                     <a:solidFill>
                       <a:srgbClr val="000000"/>
                     </a:solidFill>
@@ -10190,7 +10190,7 @@
               </a:ln>
               <a:extLst>
                 <a:ext uri="{91240B29-F687-4f45-9708-019B960494DF}">
-                  <a14:hiddenLine xmlns="" xmlns:a14="http://schemas.microsoft.com/office/drawing/2010/main" w="9525">
+                  <a14:hiddenLine xmlns:a14="http://schemas.microsoft.com/office/drawing/2010/main" xmlns="" w="9525">
                     <a:solidFill>
                       <a:srgbClr val="000000"/>
                     </a:solidFill>
@@ -10255,7 +10255,7 @@
               </a:ln>
               <a:extLst>
                 <a:ext uri="{91240B29-F687-4f45-9708-019B960494DF}">
-                  <a14:hiddenLine xmlns="" xmlns:a14="http://schemas.microsoft.com/office/drawing/2010/main" w="9525">
+                  <a14:hiddenLine xmlns:a14="http://schemas.microsoft.com/office/drawing/2010/main" xmlns="" w="9525">
                     <a:solidFill>
                       <a:srgbClr val="000000"/>
                     </a:solidFill>
@@ -10345,7 +10345,7 @@
               </a:ln>
               <a:extLst>
                 <a:ext uri="{91240B29-F687-4f45-9708-019B960494DF}">
-                  <a14:hiddenLine xmlns="" xmlns:a14="http://schemas.microsoft.com/office/drawing/2010/main" w="9525">
+                  <a14:hiddenLine xmlns:a14="http://schemas.microsoft.com/office/drawing/2010/main" xmlns="" w="9525">
                     <a:solidFill>
                       <a:srgbClr val="000000"/>
                     </a:solidFill>
@@ -10407,7 +10407,7 @@
               </a:ln>
               <a:extLst>
                 <a:ext uri="{91240B29-F687-4f45-9708-019B960494DF}">
-                  <a14:hiddenLine xmlns="" xmlns:a14="http://schemas.microsoft.com/office/drawing/2010/main" w="9525">
+                  <a14:hiddenLine xmlns:a14="http://schemas.microsoft.com/office/drawing/2010/main" xmlns="" w="9525">
                     <a:solidFill>
                       <a:srgbClr val="000000"/>
                     </a:solidFill>
@@ -10497,7 +10497,7 @@
               </a:ln>
               <a:extLst>
                 <a:ext uri="{91240B29-F687-4f45-9708-019B960494DF}">
-                  <a14:hiddenLine xmlns="" xmlns:a14="http://schemas.microsoft.com/office/drawing/2010/main" w="9525">
+                  <a14:hiddenLine xmlns:a14="http://schemas.microsoft.com/office/drawing/2010/main" xmlns="" w="9525">
                     <a:solidFill>
                       <a:srgbClr val="000000"/>
                     </a:solidFill>
@@ -10562,7 +10562,7 @@
               </a:ln>
               <a:extLst>
                 <a:ext uri="{91240B29-F687-4f45-9708-019B960494DF}">
-                  <a14:hiddenLine xmlns="" xmlns:a14="http://schemas.microsoft.com/office/drawing/2010/main" w="9525">
+                  <a14:hiddenLine xmlns:a14="http://schemas.microsoft.com/office/drawing/2010/main" xmlns="" w="9525">
                     <a:solidFill>
                       <a:srgbClr val="000000"/>
                     </a:solidFill>
@@ -10624,7 +10624,7 @@
               </a:ln>
               <a:extLst>
                 <a:ext uri="{91240B29-F687-4f45-9708-019B960494DF}">
-                  <a14:hiddenLine xmlns="" xmlns:a14="http://schemas.microsoft.com/office/drawing/2010/main" w="9525">
+                  <a14:hiddenLine xmlns:a14="http://schemas.microsoft.com/office/drawing/2010/main" xmlns="" w="9525">
                     <a:solidFill>
                       <a:srgbClr val="000000"/>
                     </a:solidFill>
@@ -10714,7 +10714,7 @@
               </a:ln>
               <a:extLst>
                 <a:ext uri="{91240B29-F687-4f45-9708-019B960494DF}">
-                  <a14:hiddenLine xmlns="" xmlns:a14="http://schemas.microsoft.com/office/drawing/2010/main" w="9525">
+                  <a14:hiddenLine xmlns:a14="http://schemas.microsoft.com/office/drawing/2010/main" xmlns="" w="9525">
                     <a:solidFill>
                       <a:srgbClr val="000000"/>
                     </a:solidFill>
@@ -10804,7 +10804,7 @@
               </a:ln>
               <a:extLst>
                 <a:ext uri="{91240B29-F687-4f45-9708-019B960494DF}">
-                  <a14:hiddenLine xmlns="" xmlns:a14="http://schemas.microsoft.com/office/drawing/2010/main" w="9525">
+                  <a14:hiddenLine xmlns:a14="http://schemas.microsoft.com/office/drawing/2010/main" xmlns="" w="9525">
                     <a:solidFill>
                       <a:srgbClr val="000000"/>
                     </a:solidFill>
@@ -10869,7 +10869,7 @@
               </a:ln>
               <a:extLst>
                 <a:ext uri="{91240B29-F687-4f45-9708-019B960494DF}">
-                  <a14:hiddenLine xmlns="" xmlns:a14="http://schemas.microsoft.com/office/drawing/2010/main" w="9525">
+                  <a14:hiddenLine xmlns:a14="http://schemas.microsoft.com/office/drawing/2010/main" xmlns="" w="9525">
                     <a:solidFill>
                       <a:srgbClr val="000000"/>
                     </a:solidFill>
@@ -10989,7 +10989,7 @@
               </a:ln>
               <a:extLst>
                 <a:ext uri="{91240B29-F687-4f45-9708-019B960494DF}">
-                  <a14:hiddenLine xmlns="" xmlns:a14="http://schemas.microsoft.com/office/drawing/2010/main" w="9525">
+                  <a14:hiddenLine xmlns:a14="http://schemas.microsoft.com/office/drawing/2010/main" xmlns="" w="9525">
                     <a:solidFill>
                       <a:srgbClr val="000000"/>
                     </a:solidFill>
@@ -11087,7 +11087,7 @@
               </a:ln>
               <a:extLst>
                 <a:ext uri="{91240B29-F687-4f45-9708-019B960494DF}">
-                  <a14:hiddenLine xmlns="" xmlns:a14="http://schemas.microsoft.com/office/drawing/2010/main" w="9525">
+                  <a14:hiddenLine xmlns:a14="http://schemas.microsoft.com/office/drawing/2010/main" xmlns="" w="9525">
                     <a:solidFill>
                       <a:srgbClr val="000000"/>
                     </a:solidFill>
@@ -11202,7 +11202,7 @@
               </a:ln>
               <a:extLst>
                 <a:ext uri="{91240B29-F687-4f45-9708-019B960494DF}">
-                  <a14:hiddenLine xmlns="" xmlns:a14="http://schemas.microsoft.com/office/drawing/2010/main" w="9525">
+                  <a14:hiddenLine xmlns:a14="http://schemas.microsoft.com/office/drawing/2010/main" xmlns="" w="9525">
                     <a:solidFill>
                       <a:srgbClr val="000000"/>
                     </a:solidFill>
@@ -11292,7 +11292,7 @@
               </a:ln>
               <a:extLst>
                 <a:ext uri="{91240B29-F687-4f45-9708-019B960494DF}">
-                  <a14:hiddenLine xmlns="" xmlns:a14="http://schemas.microsoft.com/office/drawing/2010/main" w="9525">
+                  <a14:hiddenLine xmlns:a14="http://schemas.microsoft.com/office/drawing/2010/main" xmlns="" w="9525">
                     <a:solidFill>
                       <a:srgbClr val="000000"/>
                     </a:solidFill>
@@ -11357,7 +11357,7 @@
               </a:ln>
               <a:extLst>
                 <a:ext uri="{91240B29-F687-4f45-9708-019B960494DF}">
-                  <a14:hiddenLine xmlns="" xmlns:a14="http://schemas.microsoft.com/office/drawing/2010/main" w="9525">
+                  <a14:hiddenLine xmlns:a14="http://schemas.microsoft.com/office/drawing/2010/main" xmlns="" w="9525">
                     <a:solidFill>
                       <a:srgbClr val="000000"/>
                     </a:solidFill>
@@ -11447,7 +11447,7 @@
               </a:ln>
               <a:extLst>
                 <a:ext uri="{91240B29-F687-4f45-9708-019B960494DF}">
-                  <a14:hiddenLine xmlns="" xmlns:a14="http://schemas.microsoft.com/office/drawing/2010/main" w="9525">
+                  <a14:hiddenLine xmlns:a14="http://schemas.microsoft.com/office/drawing/2010/main" xmlns="" w="9525">
                     <a:solidFill>
                       <a:srgbClr val="000000"/>
                     </a:solidFill>
@@ -11515,7 +11515,7 @@
               </a:ln>
               <a:extLst>
                 <a:ext uri="{91240B29-F687-4f45-9708-019B960494DF}">
-                  <a14:hiddenLine xmlns="" xmlns:a14="http://schemas.microsoft.com/office/drawing/2010/main" w="9525">
+                  <a14:hiddenLine xmlns:a14="http://schemas.microsoft.com/office/drawing/2010/main" xmlns="" w="9525">
                     <a:solidFill>
                       <a:srgbClr val="000000"/>
                     </a:solidFill>
@@ -11605,7 +11605,7 @@
               </a:ln>
               <a:extLst>
                 <a:ext uri="{91240B29-F687-4f45-9708-019B960494DF}">
-                  <a14:hiddenLine xmlns="" xmlns:a14="http://schemas.microsoft.com/office/drawing/2010/main" w="9525">
+                  <a14:hiddenLine xmlns:a14="http://schemas.microsoft.com/office/drawing/2010/main" xmlns="" w="9525">
                     <a:solidFill>
                       <a:srgbClr val="000000"/>
                     </a:solidFill>
@@ -11673,7 +11673,7 @@
               </a:ln>
               <a:extLst>
                 <a:ext uri="{91240B29-F687-4f45-9708-019B960494DF}">
-                  <a14:hiddenLine xmlns="" xmlns:a14="http://schemas.microsoft.com/office/drawing/2010/main" w="9525">
+                  <a14:hiddenLine xmlns:a14="http://schemas.microsoft.com/office/drawing/2010/main" xmlns="" w="9525">
                     <a:solidFill>
                       <a:srgbClr val="000000"/>
                     </a:solidFill>
@@ -11763,7 +11763,7 @@
               </a:ln>
               <a:extLst>
                 <a:ext uri="{91240B29-F687-4f45-9708-019B960494DF}">
-                  <a14:hiddenLine xmlns="" xmlns:a14="http://schemas.microsoft.com/office/drawing/2010/main" w="9525">
+                  <a14:hiddenLine xmlns:a14="http://schemas.microsoft.com/office/drawing/2010/main" xmlns="" w="9525">
                     <a:solidFill>
                       <a:srgbClr val="000000"/>
                     </a:solidFill>
@@ -11797,7 +11797,7 @@
               </a:ln>
               <a:extLst>
                 <a:ext uri="{91240B29-F687-4f45-9708-019B960494DF}">
-                  <a14:hiddenLine xmlns="" xmlns:a14="http://schemas.microsoft.com/office/drawing/2010/main" w="9525">
+                  <a14:hiddenLine xmlns:a14="http://schemas.microsoft.com/office/drawing/2010/main" xmlns="" w="9525">
                     <a:solidFill>
                       <a:srgbClr val="000000"/>
                     </a:solidFill>
@@ -11938,7 +11938,7 @@
             <a:fld id="{48A87A34-81AB-432B-8DAE-1953F412C126}" type="datetimeFigureOut">
               <a:rPr lang="en-US" dirty="0"/>
               <a:pPr/>
-              <a:t>5/5/19</a:t>
+              <a:t>5/12/2019</a:t>
             </a:fld>
             <a:endParaRPr lang="en-US" dirty="0"/>
           </a:p>
@@ -12017,7 +12017,7 @@
             <a:fld id="{6D22F896-40B5-4ADD-8801-0D06FADFA095}" type="slidenum">
               <a:rPr lang="en-US" dirty="0"/>
               <a:pPr/>
-              <a:t>‹Nr.›</a:t>
+              <a:t>‹#›</a:t>
             </a:fld>
             <a:endParaRPr lang="en-US" dirty="0"/>
           </a:p>
@@ -12454,7 +12454,7 @@
           <p:cNvPr id="2" name="Titel 1">
             <a:extLst>
               <a:ext uri="{FF2B5EF4-FFF2-40B4-BE49-F238E27FC236}">
-                <a16:creationId xmlns:a16="http://schemas.microsoft.com/office/drawing/2014/main" id="{CCDBED15-1A35-3149-A93A-90499560491B}"/>
+                <a16:creationId xmlns:a16="http://schemas.microsoft.com/office/drawing/2014/main" id="{4F216C27-C2C0-5B46-823D-B5191A31283C}"/>
               </a:ext>
             </a:extLst>
           </p:cNvPr>
@@ -12471,9 +12471,10 @@
           <a:lstStyle/>
           <a:p>
             <a:r>
-              <a:rPr lang="en-GB" dirty="0"/>
-              <a:t>Agenda</a:t>
-            </a:r>
+              <a:rPr lang="en-GB" dirty="0" err="1"/>
+              <a:t>Ideen</a:t>
+            </a:r>
+            <a:endParaRPr lang="en-GB" dirty="0"/>
           </a:p>
         </p:txBody>
       </p:sp>
@@ -12482,7 +12483,7 @@
           <p:cNvPr id="3" name="Inhaltsplatzhalter 2">
             <a:extLst>
               <a:ext uri="{FF2B5EF4-FFF2-40B4-BE49-F238E27FC236}">
-                <a16:creationId xmlns:a16="http://schemas.microsoft.com/office/drawing/2014/main" id="{622E52A9-B745-1D4F-B676-E8A689B327FE}"/>
+                <a16:creationId xmlns:a16="http://schemas.microsoft.com/office/drawing/2014/main" id="{8E484594-0DF5-E247-9130-732DC2A36385}"/>
               </a:ext>
             </a:extLst>
           </p:cNvPr>
@@ -12500,39 +12501,175 @@
           <a:p>
             <a:r>
               <a:rPr lang="en-GB" dirty="0"/>
-              <a:t>Demo Time</a:t>
-            </a:r>
-          </a:p>
-          <a:p>
+              <a:t>“</a:t>
+            </a:r>
             <a:r>
               <a:rPr lang="en-GB" dirty="0" err="1"/>
-              <a:t>Funktionalität</a:t>
+              <a:t>Routen</a:t>
+            </a:r>
+            <a:r>
+              <a:rPr lang="en-GB" dirty="0"/>
+              <a:t> </a:t>
+            </a:r>
+            <a:r>
+              <a:rPr lang="en-GB" dirty="0" err="1"/>
+              <a:t>Verbindungen</a:t>
+            </a:r>
+            <a:r>
+              <a:rPr lang="en-GB" dirty="0"/>
+              <a:t> </a:t>
+            </a:r>
+            <a:r>
+              <a:rPr lang="en-GB" dirty="0" err="1"/>
+              <a:t>schnell</a:t>
+            </a:r>
+            <a:r>
+              <a:rPr lang="en-GB" dirty="0"/>
+              <a:t> und </a:t>
+            </a:r>
+            <a:r>
+              <a:rPr lang="en-GB" dirty="0" err="1"/>
+              <a:t>einfach</a:t>
+            </a:r>
+            <a:r>
+              <a:rPr lang="en-GB" dirty="0"/>
+              <a:t> </a:t>
+            </a:r>
+            <a:r>
+              <a:rPr lang="en-GB" dirty="0" err="1"/>
+              <a:t>Anzeigen</a:t>
+            </a:r>
+            <a:r>
+              <a:rPr lang="en-GB" dirty="0"/>
+              <a:t>!”</a:t>
+            </a:r>
+          </a:p>
+          <a:p>
+            <a:pPr lvl="1"/>
+            <a:r>
+              <a:rPr lang="en-GB" dirty="0" err="1"/>
+              <a:t>Konfiguration</a:t>
+            </a:r>
+            <a:r>
+              <a:rPr lang="en-GB" dirty="0"/>
+              <a:t> von </a:t>
+            </a:r>
+            <a:r>
+              <a:rPr lang="en-GB" dirty="0" err="1"/>
+              <a:t>Routen</a:t>
+            </a:r>
+            <a:r>
+              <a:rPr lang="en-GB" dirty="0"/>
+              <a:t> (Dauer, Bus o. Bahn, </a:t>
+            </a:r>
+            <a:r>
+              <a:rPr lang="en-GB" dirty="0" err="1"/>
+              <a:t>Wochentage</a:t>
+            </a:r>
+            <a:r>
+              <a:rPr lang="en-GB" dirty="0"/>
+              <a:t>)</a:t>
+            </a:r>
+          </a:p>
+          <a:p>
+            <a:pPr lvl="1"/>
+            <a:r>
+              <a:rPr lang="en-GB" dirty="0" err="1"/>
+              <a:t>Anzeigen</a:t>
+            </a:r>
+            <a:r>
+              <a:rPr lang="en-GB" dirty="0"/>
+              <a:t> von </a:t>
+            </a:r>
+            <a:r>
+              <a:rPr lang="en-GB" dirty="0" err="1"/>
+              <a:t>Konfigurierten</a:t>
+            </a:r>
+            <a:r>
+              <a:rPr lang="en-GB" dirty="0"/>
+              <a:t> </a:t>
+            </a:r>
+            <a:r>
+              <a:rPr lang="en-GB" dirty="0" err="1"/>
+              <a:t>Routen</a:t>
             </a:r>
             <a:endParaRPr lang="en-GB" dirty="0"/>
           </a:p>
           <a:p>
+            <a:pPr lvl="1"/>
+            <a:endParaRPr lang="en-GB" dirty="0"/>
+          </a:p>
+          <a:p>
+            <a:r>
+              <a:rPr lang="en-GB" dirty="0"/>
+              <a:t>GPS </a:t>
+            </a:r>
             <a:r>
               <a:rPr lang="en-GB" dirty="0" err="1"/>
-              <a:t>Probleme</a:t>
+              <a:t>basierend</a:t>
+            </a:r>
+            <a:endParaRPr lang="en-GB" dirty="0"/>
+          </a:p>
+          <a:p>
+            <a:pPr lvl="1"/>
+            <a:r>
+              <a:rPr lang="en-GB" dirty="0" err="1"/>
+              <a:t>Interessant</a:t>
             </a:r>
             <a:r>
               <a:rPr lang="en-GB" dirty="0"/>
-              <a:t> / Stolpersteine</a:t>
-            </a:r>
-          </a:p>
-          <a:p>
+              <a:t> </a:t>
+            </a:r>
             <a:r>
               <a:rPr lang="en-GB" dirty="0" err="1"/>
-              <a:t>Ideen</a:t>
-            </a:r>
-            <a:endParaRPr lang="en-GB" dirty="0"/>
+              <a:t>für</a:t>
+            </a:r>
+            <a:r>
+              <a:rPr lang="en-GB" dirty="0"/>
+              <a:t> tracking</a:t>
+            </a:r>
+          </a:p>
+          <a:p>
+            <a:pPr lvl="1"/>
+            <a:r>
+              <a:rPr lang="en-GB" dirty="0" err="1"/>
+              <a:t>Daten</a:t>
+            </a:r>
+            <a:r>
+              <a:rPr lang="en-GB" dirty="0"/>
+              <a:t> </a:t>
+            </a:r>
+            <a:r>
+              <a:rPr lang="de-CH" dirty="0"/>
+              <a:t>→</a:t>
+            </a:r>
+            <a:r>
+              <a:rPr lang="en-GB" dirty="0"/>
+              <a:t> das </a:t>
+            </a:r>
+            <a:r>
+              <a:rPr lang="en-GB" dirty="0" err="1"/>
+              <a:t>neue</a:t>
+            </a:r>
+            <a:r>
+              <a:rPr lang="en-GB" dirty="0"/>
+              <a:t> </a:t>
+            </a:r>
+            <a:r>
+              <a:rPr lang="en-GB" dirty="0" err="1"/>
+              <a:t>Öl</a:t>
+            </a:r>
+            <a:r>
+              <a:rPr lang="en-GB" dirty="0"/>
+              <a:t> </a:t>
+            </a:r>
           </a:p>
         </p:txBody>
       </p:sp>
     </p:spTree>
     <p:extLst>
       <p:ext uri="{BB962C8B-B14F-4D97-AF65-F5344CB8AC3E}">
-        <p14:creationId xmlns:p14="http://schemas.microsoft.com/office/powerpoint/2010/main" val="3936367577"/>
+        <p14:creationId xmlns:p14="http://schemas.microsoft.com/office/powerpoint/2010/main" val="2291051185"/>
       </p:ext>
     </p:extLst>
   </p:cSld>
@@ -12543,6 +12680,111 @@
 </file>
 
 <file path=ppt/slides/slide3.xml><?xml version="1.0" encoding="utf-8"?>
+<p:sld xmlns:a="http://schemas.openxmlformats.org/drawingml/2006/main" xmlns:r="http://schemas.openxmlformats.org/officeDocument/2006/relationships" xmlns:p="http://schemas.openxmlformats.org/presentationml/2006/main">
+  <p:cSld>
+    <p:spTree>
+      <p:nvGrpSpPr>
+        <p:cNvPr id="1" name=""/>
+        <p:cNvGrpSpPr/>
+        <p:nvPr/>
+      </p:nvGrpSpPr>
+      <p:grpSpPr>
+        <a:xfrm>
+          <a:off x="0" y="0"/>
+          <a:ext cx="0" cy="0"/>
+          <a:chOff x="0" y="0"/>
+          <a:chExt cx="0" cy="0"/>
+        </a:xfrm>
+      </p:grpSpPr>
+      <p:sp>
+        <p:nvSpPr>
+          <p:cNvPr id="2" name="Titel 1">
+            <a:extLst>
+              <a:ext uri="{FF2B5EF4-FFF2-40B4-BE49-F238E27FC236}">
+                <a16:creationId xmlns:a16="http://schemas.microsoft.com/office/drawing/2014/main" id="{84109D84-2A70-8246-8392-5C48CDBB6F6B}"/>
+              </a:ext>
+            </a:extLst>
+          </p:cNvPr>
+          <p:cNvSpPr>
+            <a:spLocks noGrp="1"/>
+          </p:cNvSpPr>
+          <p:nvPr>
+            <p:ph type="title"/>
+          </p:nvPr>
+        </p:nvSpPr>
+        <p:spPr/>
+        <p:txBody>
+          <a:bodyPr/>
+          <a:lstStyle/>
+          <a:p>
+            <a:r>
+              <a:rPr lang="en-GB" dirty="0" err="1"/>
+              <a:t>Funktionalität</a:t>
+            </a:r>
+            <a:endParaRPr lang="en-GB" dirty="0"/>
+          </a:p>
+        </p:txBody>
+      </p:sp>
+      <p:sp>
+        <p:nvSpPr>
+          <p:cNvPr id="3" name="Inhaltsplatzhalter 2">
+            <a:extLst>
+              <a:ext uri="{FF2B5EF4-FFF2-40B4-BE49-F238E27FC236}">
+                <a16:creationId xmlns:a16="http://schemas.microsoft.com/office/drawing/2014/main" id="{0A3D83F2-76D8-144F-912E-8BCA8A12A922}"/>
+              </a:ext>
+            </a:extLst>
+          </p:cNvPr>
+          <p:cNvSpPr>
+            <a:spLocks noGrp="1"/>
+          </p:cNvSpPr>
+          <p:nvPr>
+            <p:ph idx="1"/>
+          </p:nvPr>
+        </p:nvSpPr>
+        <p:spPr/>
+        <p:txBody>
+          <a:bodyPr/>
+          <a:lstStyle/>
+          <a:p>
+            <a:r>
+              <a:rPr lang="en-GB" dirty="0"/>
+              <a:t>OPENDATA TRANSPORT API</a:t>
+            </a:r>
+          </a:p>
+          <a:p>
+            <a:r>
+              <a:rPr lang="en-GB" dirty="0"/>
+              <a:t>LOCAL DB</a:t>
+            </a:r>
+          </a:p>
+          <a:p>
+            <a:r>
+              <a:rPr lang="en-GB" dirty="0"/>
+              <a:t>TWO SCREENS</a:t>
+            </a:r>
+          </a:p>
+          <a:p>
+            <a:r>
+              <a:rPr lang="en-GB" dirty="0"/>
+              <a:t>DYNAMIC UI </a:t>
+            </a:r>
+          </a:p>
+        </p:txBody>
+      </p:sp>
+    </p:spTree>
+    <p:extLst>
+      <p:ext uri="{BB962C8B-B14F-4D97-AF65-F5344CB8AC3E}">
+        <p14:creationId xmlns:p14="http://schemas.microsoft.com/office/powerpoint/2010/main" val="1441089697"/>
+      </p:ext>
+    </p:extLst>
+  </p:cSld>
+  <p:clrMapOvr>
+    <a:masterClrMapping/>
+  </p:clrMapOvr>
+</p:sld>
+</file>
+
+<file path=ppt/slides/slide4.xml><?xml version="1.0" encoding="utf-8"?>
 <p:sld xmlns:a="http://schemas.openxmlformats.org/drawingml/2006/main" xmlns:r="http://schemas.openxmlformats.org/officeDocument/2006/relationships" xmlns:p="http://schemas.openxmlformats.org/presentationml/2006/main">
   <p:cSld>
     <p:spTree>
@@ -12630,111 +12872,6 @@
     <p:extLst>
       <p:ext uri="{BB962C8B-B14F-4D97-AF65-F5344CB8AC3E}">
         <p14:creationId xmlns:p14="http://schemas.microsoft.com/office/powerpoint/2010/main" val="1214323379"/>
-      </p:ext>
-    </p:extLst>
-  </p:cSld>
-  <p:clrMapOvr>
-    <a:masterClrMapping/>
-  </p:clrMapOvr>
-</p:sld>
-</file>
-
-<file path=ppt/slides/slide4.xml><?xml version="1.0" encoding="utf-8"?>
-<p:sld xmlns:a="http://schemas.openxmlformats.org/drawingml/2006/main" xmlns:r="http://schemas.openxmlformats.org/officeDocument/2006/relationships" xmlns:p="http://schemas.openxmlformats.org/presentationml/2006/main">
-  <p:cSld>
-    <p:spTree>
-      <p:nvGrpSpPr>
-        <p:cNvPr id="1" name=""/>
-        <p:cNvGrpSpPr/>
-        <p:nvPr/>
-      </p:nvGrpSpPr>
-      <p:grpSpPr>
-        <a:xfrm>
-          <a:off x="0" y="0"/>
-          <a:ext cx="0" cy="0"/>
-          <a:chOff x="0" y="0"/>
-          <a:chExt cx="0" cy="0"/>
-        </a:xfrm>
-      </p:grpSpPr>
-      <p:sp>
-        <p:nvSpPr>
-          <p:cNvPr id="2" name="Titel 1">
-            <a:extLst>
-              <a:ext uri="{FF2B5EF4-FFF2-40B4-BE49-F238E27FC236}">
-                <a16:creationId xmlns:a16="http://schemas.microsoft.com/office/drawing/2014/main" id="{84109D84-2A70-8246-8392-5C48CDBB6F6B}"/>
-              </a:ext>
-            </a:extLst>
-          </p:cNvPr>
-          <p:cNvSpPr>
-            <a:spLocks noGrp="1"/>
-          </p:cNvSpPr>
-          <p:nvPr>
-            <p:ph type="title"/>
-          </p:nvPr>
-        </p:nvSpPr>
-        <p:spPr/>
-        <p:txBody>
-          <a:bodyPr/>
-          <a:lstStyle/>
-          <a:p>
-            <a:r>
-              <a:rPr lang="en-GB" dirty="0" err="1"/>
-              <a:t>Funktionalität</a:t>
-            </a:r>
-            <a:endParaRPr lang="en-GB" dirty="0"/>
-          </a:p>
-        </p:txBody>
-      </p:sp>
-      <p:sp>
-        <p:nvSpPr>
-          <p:cNvPr id="3" name="Inhaltsplatzhalter 2">
-            <a:extLst>
-              <a:ext uri="{FF2B5EF4-FFF2-40B4-BE49-F238E27FC236}">
-                <a16:creationId xmlns:a16="http://schemas.microsoft.com/office/drawing/2014/main" id="{0A3D83F2-76D8-144F-912E-8BCA8A12A922}"/>
-              </a:ext>
-            </a:extLst>
-          </p:cNvPr>
-          <p:cNvSpPr>
-            <a:spLocks noGrp="1"/>
-          </p:cNvSpPr>
-          <p:nvPr>
-            <p:ph idx="1"/>
-          </p:nvPr>
-        </p:nvSpPr>
-        <p:spPr/>
-        <p:txBody>
-          <a:bodyPr/>
-          <a:lstStyle/>
-          <a:p>
-            <a:r>
-              <a:rPr lang="en-GB" dirty="0"/>
-              <a:t>OPENDATA TRANSPORT API</a:t>
-            </a:r>
-          </a:p>
-          <a:p>
-            <a:r>
-              <a:rPr lang="en-GB" dirty="0"/>
-              <a:t>LOCAL DB</a:t>
-            </a:r>
-          </a:p>
-          <a:p>
-            <a:r>
-              <a:rPr lang="en-GB" dirty="0"/>
-              <a:t>TWO SCREENS</a:t>
-            </a:r>
-          </a:p>
-          <a:p>
-            <a:r>
-              <a:rPr lang="en-GB" dirty="0"/>
-              <a:t>DYNAMIC UI </a:t>
-            </a:r>
-          </a:p>
-        </p:txBody>
-      </p:sp>
-    </p:spTree>
-    <p:extLst>
-      <p:ext uri="{BB962C8B-B14F-4D97-AF65-F5344CB8AC3E}">
-        <p14:creationId xmlns:p14="http://schemas.microsoft.com/office/powerpoint/2010/main" val="1441089697"/>
       </p:ext>
     </p:extLst>
   </p:cSld>
@@ -12819,12 +12956,6 @@
               <a:t>RTFM! (Transport API)</a:t>
             </a:r>
           </a:p>
-          <a:p>
-            <a:r>
-              <a:rPr lang="en-GB" dirty="0"/>
-              <a:t>Room Foreign Keys WTF!</a:t>
-            </a:r>
-          </a:p>
         </p:txBody>
       </p:sp>
     </p:spTree>
@@ -12862,7 +12993,7 @@
           <p:cNvPr id="2" name="Titel 1">
             <a:extLst>
               <a:ext uri="{FF2B5EF4-FFF2-40B4-BE49-F238E27FC236}">
-                <a16:creationId xmlns:a16="http://schemas.microsoft.com/office/drawing/2014/main" id="{4F216C27-C2C0-5B46-823D-B5191A31283C}"/>
+                <a16:creationId xmlns:a16="http://schemas.microsoft.com/office/drawing/2014/main" id="{0D267DE2-01BE-DC4E-BDBD-2C6E98839D7E}"/>
               </a:ext>
             </a:extLst>
           </p:cNvPr>
@@ -12880,9 +13011,12 @@
           <a:p>
             <a:r>
               <a:rPr lang="en-GB" dirty="0" err="1"/>
-              <a:t>Ideen</a:t>
-            </a:r>
-            <a:endParaRPr lang="en-GB" dirty="0"/>
+              <a:t>Probleme</a:t>
+            </a:r>
+            <a:r>
+              <a:rPr lang="en-GB" dirty="0"/>
+              <a:t> / stolpersteine</a:t>
+            </a:r>
           </a:p>
         </p:txBody>
       </p:sp>
@@ -12891,7 +13025,7 @@
           <p:cNvPr id="3" name="Inhaltsplatzhalter 2">
             <a:extLst>
               <a:ext uri="{FF2B5EF4-FFF2-40B4-BE49-F238E27FC236}">
-                <a16:creationId xmlns:a16="http://schemas.microsoft.com/office/drawing/2014/main" id="{8E484594-0DF5-E247-9130-732DC2A36385}"/>
+                <a16:creationId xmlns:a16="http://schemas.microsoft.com/office/drawing/2014/main" id="{05346D18-1D07-5442-BEB4-8C07A849FA41}"/>
               </a:ext>
             </a:extLst>
           </p:cNvPr>
@@ -12909,175 +13043,47 @@
           <a:p>
             <a:r>
               <a:rPr lang="en-GB" dirty="0"/>
-              <a:t>“</a:t>
+              <a:t>Room </a:t>
+            </a:r>
+            <a:r>
+              <a:rPr lang="en-CH" dirty="0"/>
+              <a:t>doesn’t support f</a:t>
             </a:r>
             <a:r>
               <a:rPr lang="en-GB" dirty="0" err="1"/>
-              <a:t>Routen</a:t>
+              <a:t>oreign</a:t>
             </a:r>
             <a:r>
               <a:rPr lang="en-GB" dirty="0"/>
               <a:t> </a:t>
             </a:r>
             <a:r>
+              <a:rPr lang="en-CH" dirty="0"/>
+              <a:t>k</a:t>
+            </a:r>
+            <a:r>
               <a:rPr lang="en-GB" dirty="0" err="1"/>
-              <a:t>Verbindungen</a:t>
-            </a:r>
-            <a:r>
-              <a:rPr lang="en-GB" dirty="0"/>
-              <a:t> </a:t>
-            </a:r>
-            <a:r>
-              <a:rPr lang="en-GB" dirty="0" err="1"/>
-              <a:t>schnell</a:t>
-            </a:r>
-            <a:r>
-              <a:rPr lang="en-GB" dirty="0"/>
-              <a:t> und </a:t>
-            </a:r>
-            <a:r>
-              <a:rPr lang="en-GB" dirty="0" err="1"/>
-              <a:t>einfach</a:t>
-            </a:r>
-            <a:r>
-              <a:rPr lang="en-GB" dirty="0"/>
-              <a:t> </a:t>
-            </a:r>
-            <a:r>
-              <a:rPr lang="en-GB" dirty="0" err="1"/>
-              <a:t>Anzeigen</a:t>
-            </a:r>
-            <a:r>
-              <a:rPr lang="en-GB" dirty="0"/>
-              <a:t>!”</a:t>
-            </a:r>
-          </a:p>
-          <a:p>
-            <a:pPr lvl="1"/>
-            <a:r>
-              <a:rPr lang="en-GB" dirty="0" err="1"/>
-              <a:t>Konfiguration</a:t>
-            </a:r>
-            <a:r>
-              <a:rPr lang="en-GB" dirty="0"/>
-              <a:t> von </a:t>
-            </a:r>
-            <a:r>
-              <a:rPr lang="en-GB" dirty="0" err="1"/>
-              <a:t>Routen</a:t>
-            </a:r>
-            <a:r>
-              <a:rPr lang="en-GB" dirty="0"/>
-              <a:t> (Dauer, Bus o. Bahn, </a:t>
-            </a:r>
-            <a:r>
-              <a:rPr lang="en-GB" dirty="0" err="1"/>
-              <a:t>Wochentage</a:t>
-            </a:r>
-            <a:r>
-              <a:rPr lang="en-GB" dirty="0"/>
-              <a:t>)</a:t>
-            </a:r>
-          </a:p>
-          <a:p>
-            <a:pPr lvl="1"/>
-            <a:r>
-              <a:rPr lang="en-GB" dirty="0" err="1"/>
-              <a:t>Anzeigen</a:t>
-            </a:r>
-            <a:r>
-              <a:rPr lang="en-GB" dirty="0"/>
-              <a:t> von </a:t>
-            </a:r>
-            <a:r>
-              <a:rPr lang="en-GB" dirty="0" err="1"/>
-              <a:t>Konfigurierten</a:t>
-            </a:r>
-            <a:r>
-              <a:rPr lang="en-GB" dirty="0"/>
-              <a:t> </a:t>
-            </a:r>
-            <a:r>
-              <a:rPr lang="en-GB" dirty="0" err="1"/>
-              <a:t>Routen</a:t>
+              <a:t>eys</a:t>
+            </a:r>
+            <a:endParaRPr lang="en-CH" dirty="0"/>
+          </a:p>
+          <a:p>
+            <a:r>
+              <a:rPr lang="en-CH" dirty="0" err="1"/>
+              <a:t>Aysnc</a:t>
+            </a:r>
+            <a:r>
+              <a:rPr lang="en-CH" dirty="0"/>
+              <a:t> Tasks lead to chaos in the code</a:t>
             </a:r>
             <a:endParaRPr lang="en-GB" dirty="0"/>
-          </a:p>
-          <a:p>
-            <a:pPr lvl="1"/>
-            <a:endParaRPr lang="en-GB" dirty="0"/>
-          </a:p>
-          <a:p>
-            <a:r>
-              <a:rPr lang="en-GB" dirty="0"/>
-              <a:t>GPS </a:t>
-            </a:r>
-            <a:r>
-              <a:rPr lang="en-GB" dirty="0" err="1"/>
-              <a:t>basierend</a:t>
-            </a:r>
-            <a:endParaRPr lang="en-GB" dirty="0"/>
-          </a:p>
-          <a:p>
-            <a:pPr lvl="1"/>
-            <a:r>
-              <a:rPr lang="en-GB" dirty="0" err="1"/>
-              <a:t>Interessant</a:t>
-            </a:r>
-            <a:r>
-              <a:rPr lang="en-GB" dirty="0"/>
-              <a:t> </a:t>
-            </a:r>
-            <a:r>
-              <a:rPr lang="en-GB" dirty="0" err="1"/>
-              <a:t>für</a:t>
-            </a:r>
-            <a:r>
-              <a:rPr lang="en-GB" dirty="0"/>
-              <a:t> tracking</a:t>
-            </a:r>
-          </a:p>
-          <a:p>
-            <a:pPr lvl="1"/>
-            <a:r>
-              <a:rPr lang="en-GB" dirty="0" err="1"/>
-              <a:t>Daten</a:t>
-            </a:r>
-            <a:r>
-              <a:rPr lang="en-GB" dirty="0"/>
-              <a:t> </a:t>
-            </a:r>
-            <a:r>
-              <a:rPr lang="de-CH" dirty="0"/>
-              <a:t>→</a:t>
-            </a:r>
-            <a:r>
-              <a:rPr lang="en-GB" dirty="0"/>
-              <a:t> das </a:t>
-            </a:r>
-            <a:r>
-              <a:rPr lang="en-GB" dirty="0" err="1"/>
-              <a:t>neue</a:t>
-            </a:r>
-            <a:r>
-              <a:rPr lang="en-GB" dirty="0"/>
-              <a:t> </a:t>
-            </a:r>
-            <a:r>
-              <a:rPr lang="en-GB" dirty="0" err="1"/>
-              <a:t>Öl</a:t>
-            </a:r>
-            <a:r>
-              <a:rPr lang="en-GB" dirty="0"/>
-              <a:t> </a:t>
-            </a:r>
           </a:p>
         </p:txBody>
       </p:sp>
     </p:spTree>
     <p:extLst>
       <p:ext uri="{BB962C8B-B14F-4D97-AF65-F5344CB8AC3E}">
-        <p14:creationId xmlns:p14="http://schemas.microsoft.com/office/powerpoint/2010/main" val="2291051185"/>
+        <p14:creationId xmlns:p14="http://schemas.microsoft.com/office/powerpoint/2010/main" val="37475682"/>
       </p:ext>
     </p:extLst>
   </p:cSld>

</xml_diff>